<commit_message>
update week 04 ppt
</commit_message>
<xml_diff>
--- a/ppt/WEEK 04.pptx
+++ b/ppt/WEEK 04.pptx
@@ -12,11 +12,12 @@
     <p:sldId id="261" r:id="rId6"/>
     <p:sldId id="260" r:id="rId7"/>
     <p:sldId id="258" r:id="rId8"/>
-    <p:sldId id="264" r:id="rId9"/>
-    <p:sldId id="265" r:id="rId10"/>
-    <p:sldId id="266" r:id="rId11"/>
-    <p:sldId id="267" r:id="rId12"/>
-    <p:sldId id="262" r:id="rId13"/>
+    <p:sldId id="268" r:id="rId9"/>
+    <p:sldId id="264" r:id="rId10"/>
+    <p:sldId id="265" r:id="rId11"/>
+    <p:sldId id="266" r:id="rId12"/>
+    <p:sldId id="267" r:id="rId13"/>
+    <p:sldId id="262" r:id="rId14"/>
   </p:sldIdLst>
   <p:sldSz cx="12192000" cy="6858000"/>
   <p:notesSz cx="6858000" cy="9144000"/>
@@ -136,7 +137,7 @@
   <pc:docChgLst>
     <pc:chgData name="畯田 陳" userId="9b910162c87189d3" providerId="LiveId" clId="{1F48E7E9-AAFA-468F-B874-77432E9E4F71}"/>
     <pc:docChg chg="custSel addSld delSld modSld sldOrd">
-      <pc:chgData name="畯田 陳" userId="9b910162c87189d3" providerId="LiveId" clId="{1F48E7E9-AAFA-468F-B874-77432E9E4F71}" dt="2023-03-29T03:09:23.704" v="785" actId="1076"/>
+      <pc:chgData name="畯田 陳" userId="9b910162c87189d3" providerId="LiveId" clId="{1F48E7E9-AAFA-468F-B874-77432E9E4F71}" dt="2023-03-29T08:00:07.514" v="792"/>
       <pc:docMkLst>
         <pc:docMk/>
       </pc:docMkLst>
@@ -471,6 +472,29 @@
           </ac:picMkLst>
         </pc:picChg>
       </pc:sldChg>
+      <pc:sldChg chg="modSp add mod ord">
+        <pc:chgData name="畯田 陳" userId="9b910162c87189d3" providerId="LiveId" clId="{1F48E7E9-AAFA-468F-B874-77432E9E4F71}" dt="2023-03-29T08:00:07.514" v="792"/>
+        <pc:sldMkLst>
+          <pc:docMk/>
+          <pc:sldMk cId="3135465547" sldId="268"/>
+        </pc:sldMkLst>
+        <pc:spChg chg="mod">
+          <ac:chgData name="畯田 陳" userId="9b910162c87189d3" providerId="LiveId" clId="{1F48E7E9-AAFA-468F-B874-77432E9E4F71}" dt="2023-03-29T08:00:04.056" v="790"/>
+          <ac:spMkLst>
+            <pc:docMk/>
+            <pc:sldMk cId="3135465547" sldId="268"/>
+            <ac:spMk id="2" creationId="{B6E5EBF2-4C39-8F9C-F687-C8796CD21DA6}"/>
+          </ac:spMkLst>
+        </pc:spChg>
+        <pc:spChg chg="mod">
+          <ac:chgData name="畯田 陳" userId="9b910162c87189d3" providerId="LiveId" clId="{1F48E7E9-AAFA-468F-B874-77432E9E4F71}" dt="2023-03-29T07:59:48.417" v="789"/>
+          <ac:spMkLst>
+            <pc:docMk/>
+            <pc:sldMk cId="3135465547" sldId="268"/>
+            <ac:spMk id="3" creationId="{E1980690-5E62-327C-A2E2-E74BFD09A5CF}"/>
+          </ac:spMkLst>
+        </pc:spChg>
+      </pc:sldChg>
     </pc:docChg>
   </pc:docChgLst>
 </pc:chgInfo>
@@ -3808,6 +3832,96 @@
             <a:pPr algn="ctr"/>
             <a:r>
               <a:rPr lang="de-DE" altLang="zh-TW" b="1" dirty="0"/>
+              <a:t>List Comprehension</a:t>
+            </a:r>
+            <a:endParaRPr lang="zh-TW" altLang="en-US" b="1" dirty="0"/>
+          </a:p>
+        </p:txBody>
+      </p:sp>
+      <p:sp>
+        <p:nvSpPr>
+          <p:cNvPr id="3" name="內容版面配置區 2">
+            <a:extLst>
+              <a:ext uri="{FF2B5EF4-FFF2-40B4-BE49-F238E27FC236}">
+                <a16:creationId xmlns:a16="http://schemas.microsoft.com/office/drawing/2014/main" id="{E1980690-5E62-327C-A2E2-E74BFD09A5CF}"/>
+              </a:ext>
+            </a:extLst>
+          </p:cNvPr>
+          <p:cNvSpPr>
+            <a:spLocks noGrp="1"/>
+          </p:cNvSpPr>
+          <p:nvPr>
+            <p:ph idx="1"/>
+          </p:nvPr>
+        </p:nvSpPr>
+        <p:spPr/>
+        <p:txBody>
+          <a:bodyPr>
+            <a:normAutofit/>
+          </a:bodyPr>
+          <a:lstStyle/>
+          <a:p>
+            <a:r>
+              <a:rPr lang="en-US" altLang="zh-TW" dirty="0"/>
+              <a:t>list = [x for x in range(0,10)] </a:t>
+            </a:r>
+          </a:p>
+        </p:txBody>
+      </p:sp>
+    </p:spTree>
+    <p:extLst>
+      <p:ext uri="{BB962C8B-B14F-4D97-AF65-F5344CB8AC3E}">
+        <p14:creationId xmlns:p14="http://schemas.microsoft.com/office/powerpoint/2010/main" val="2808680511"/>
+      </p:ext>
+    </p:extLst>
+  </p:cSld>
+  <p:clrMapOvr>
+    <a:masterClrMapping/>
+  </p:clrMapOvr>
+</p:sld>
+</file>
+
+<file path=ppt/slides/slide11.xml><?xml version="1.0" encoding="utf-8"?>
+<p:sld xmlns:a="http://schemas.openxmlformats.org/drawingml/2006/main" xmlns:r="http://schemas.openxmlformats.org/officeDocument/2006/relationships" xmlns:p="http://schemas.openxmlformats.org/presentationml/2006/main">
+  <p:cSld>
+    <p:spTree>
+      <p:nvGrpSpPr>
+        <p:cNvPr id="1" name=""/>
+        <p:cNvGrpSpPr/>
+        <p:nvPr/>
+      </p:nvGrpSpPr>
+      <p:grpSpPr>
+        <a:xfrm>
+          <a:off x="0" y="0"/>
+          <a:ext cx="0" cy="0"/>
+          <a:chOff x="0" y="0"/>
+          <a:chExt cx="0" cy="0"/>
+        </a:xfrm>
+      </p:grpSpPr>
+      <p:sp>
+        <p:nvSpPr>
+          <p:cNvPr id="2" name="標題 1">
+            <a:extLst>
+              <a:ext uri="{FF2B5EF4-FFF2-40B4-BE49-F238E27FC236}">
+                <a16:creationId xmlns:a16="http://schemas.microsoft.com/office/drawing/2014/main" id="{B6E5EBF2-4C39-8F9C-F687-C8796CD21DA6}"/>
+              </a:ext>
+            </a:extLst>
+          </p:cNvPr>
+          <p:cNvSpPr>
+            <a:spLocks noGrp="1"/>
+          </p:cNvSpPr>
+          <p:nvPr>
+            <p:ph type="title"/>
+          </p:nvPr>
+        </p:nvSpPr>
+        <p:spPr/>
+        <p:txBody>
+          <a:bodyPr/>
+          <a:lstStyle/>
+          <a:p>
+            <a:pPr algn="ctr"/>
+            <a:r>
+              <a:rPr lang="de-DE" altLang="zh-TW" b="1" dirty="0"/>
               <a:t>Function-Why</a:t>
             </a:r>
             <a:endParaRPr lang="zh-TW" altLang="en-US" b="1" dirty="0"/>
@@ -3950,7 +4064,7 @@
 </p:sld>
 </file>
 
-<file path=ppt/slides/slide11.xml><?xml version="1.0" encoding="utf-8"?>
+<file path=ppt/slides/slide12.xml><?xml version="1.0" encoding="utf-8"?>
 <p:sld xmlns:a="http://schemas.openxmlformats.org/drawingml/2006/main" xmlns:r="http://schemas.openxmlformats.org/officeDocument/2006/relationships" xmlns:p="http://schemas.openxmlformats.org/presentationml/2006/main">
   <p:cSld>
     <p:spTree>
@@ -4046,7 +4160,7 @@
 </p:sld>
 </file>
 
-<file path=ppt/slides/slide12.xml><?xml version="1.0" encoding="utf-8"?>
+<file path=ppt/slides/slide13.xml><?xml version="1.0" encoding="utf-8"?>
 <p:sld xmlns:a="http://schemas.openxmlformats.org/drawingml/2006/main" xmlns:r="http://schemas.openxmlformats.org/officeDocument/2006/relationships" xmlns:p="http://schemas.openxmlformats.org/presentationml/2006/main">
   <p:cSld>
     <p:spTree>
@@ -4963,7 +5077,7 @@
             <a:pPr algn="ctr"/>
             <a:r>
               <a:rPr lang="en-US" altLang="zh-TW" b="1" dirty="0"/>
-              <a:t>List</a:t>
+              <a:t>String</a:t>
             </a:r>
             <a:r>
               <a:rPr lang="zh-TW" altLang="en-US" b="1" dirty="0"/>
@@ -4996,212 +5110,21 @@
         <p:spPr/>
         <p:txBody>
           <a:bodyPr>
-            <a:normAutofit fontScale="77500" lnSpcReduction="20000"/>
+            <a:normAutofit/>
           </a:bodyPr>
           <a:lstStyle/>
           <a:p>
             <a:r>
               <a:rPr lang="en-US" altLang="zh-TW" dirty="0"/>
-              <a:t>index : []</a:t>
-            </a:r>
-          </a:p>
-          <a:p>
-            <a:r>
-              <a:rPr lang="en-US" altLang="zh-TW" dirty="0" err="1"/>
-              <a:t>list.append</a:t>
-            </a:r>
-            <a:r>
-              <a:rPr lang="en-US" altLang="zh-TW" dirty="0"/>
-              <a:t>(</a:t>
-            </a:r>
-            <a:r>
-              <a:rPr lang="en-US" altLang="zh-TW" b="0" i="0" dirty="0">
-                <a:solidFill>
-                  <a:srgbClr val="292929"/>
-                </a:solidFill>
-                <a:effectLst/>
-                <a:latin typeface="source-code-pro"/>
-              </a:rPr>
-              <a:t>object</a:t>
-            </a:r>
-            <a:r>
-              <a:rPr lang="en-US" altLang="zh-TW" dirty="0"/>
-              <a:t>)</a:t>
-            </a:r>
-          </a:p>
-          <a:p>
-            <a:r>
-              <a:rPr lang="en-US" altLang="zh-TW" b="0" i="0" dirty="0" err="1">
-                <a:solidFill>
-                  <a:srgbClr val="292929"/>
-                </a:solidFill>
-                <a:effectLst/>
-                <a:latin typeface="source-code-pro"/>
-              </a:rPr>
-              <a:t>list.insert</a:t>
-            </a:r>
-            <a:r>
-              <a:rPr lang="en-US" altLang="zh-TW" b="0" i="0" dirty="0">
-                <a:solidFill>
-                  <a:srgbClr val="292929"/>
-                </a:solidFill>
-                <a:effectLst/>
-                <a:latin typeface="source-code-pro"/>
-              </a:rPr>
-              <a:t>(position, object)</a:t>
-            </a:r>
-          </a:p>
-          <a:p>
-            <a:r>
-              <a:rPr lang="en-US" altLang="zh-TW" dirty="0" err="1"/>
-              <a:t>list.extend</a:t>
-            </a:r>
-            <a:r>
-              <a:rPr lang="en-US" altLang="zh-TW" dirty="0"/>
-              <a:t>()</a:t>
-            </a:r>
-          </a:p>
-          <a:p>
-            <a:r>
-              <a:rPr lang="de-DE" altLang="zh-TW" b="0" i="0" dirty="0">
-                <a:solidFill>
-                  <a:srgbClr val="292929"/>
-                </a:solidFill>
-                <a:effectLst/>
-                <a:latin typeface="source-code-pro"/>
-              </a:rPr>
-              <a:t>list.remove(object)</a:t>
-            </a:r>
-          </a:p>
-          <a:p>
-            <a:r>
-              <a:rPr lang="de-DE" altLang="zh-TW" b="0" i="0" dirty="0">
-                <a:solidFill>
-                  <a:srgbClr val="292929"/>
-                </a:solidFill>
-                <a:effectLst/>
-                <a:latin typeface="source-code-pro"/>
-              </a:rPr>
-              <a:t>list.pop()</a:t>
-            </a:r>
-            <a:endParaRPr lang="de-DE" altLang="zh-TW" dirty="0">
-              <a:solidFill>
-                <a:srgbClr val="292929"/>
-              </a:solidFill>
-              <a:latin typeface="source-code-pro"/>
-            </a:endParaRPr>
-          </a:p>
-          <a:p>
-            <a:r>
-              <a:rPr lang="de-DE" altLang="zh-TW" b="0" i="0" dirty="0">
-                <a:solidFill>
-                  <a:srgbClr val="292929"/>
-                </a:solidFill>
-                <a:effectLst/>
-                <a:latin typeface="source-code-pro"/>
-              </a:rPr>
-              <a:t>list.sort(reverse=True/False)</a:t>
-            </a:r>
-          </a:p>
-          <a:p>
-            <a:r>
-              <a:rPr lang="en-US" altLang="zh-TW" b="0" i="0" dirty="0" err="1">
-                <a:solidFill>
-                  <a:srgbClr val="292929"/>
-                </a:solidFill>
-                <a:effectLst/>
-                <a:latin typeface="source-code-pro"/>
-              </a:rPr>
-              <a:t>sorted_list</a:t>
-            </a:r>
-            <a:r>
-              <a:rPr lang="en-US" altLang="zh-TW" b="0" i="0" dirty="0">
-                <a:solidFill>
-                  <a:srgbClr val="292929"/>
-                </a:solidFill>
-                <a:effectLst/>
-                <a:latin typeface="source-code-pro"/>
-              </a:rPr>
-              <a:t> = sorted(</a:t>
-            </a:r>
-            <a:r>
-              <a:rPr lang="en-US" altLang="zh-TW" b="0" i="0" dirty="0" err="1">
-                <a:solidFill>
-                  <a:srgbClr val="292929"/>
-                </a:solidFill>
-                <a:effectLst/>
-                <a:latin typeface="source-code-pro"/>
-              </a:rPr>
-              <a:t>list_name</a:t>
-            </a:r>
-            <a:r>
-              <a:rPr lang="en-US" altLang="zh-TW" b="0" i="0" dirty="0">
-                <a:solidFill>
-                  <a:srgbClr val="292929"/>
-                </a:solidFill>
-                <a:effectLst/>
-                <a:latin typeface="source-code-pro"/>
-              </a:rPr>
-              <a:t>)</a:t>
-            </a:r>
-            <a:endParaRPr lang="de-DE" altLang="zh-TW" dirty="0">
-              <a:solidFill>
-                <a:srgbClr val="292929"/>
-              </a:solidFill>
-              <a:latin typeface="source-code-pro"/>
-            </a:endParaRPr>
-          </a:p>
-          <a:p>
-            <a:r>
-              <a:rPr lang="de-DE" altLang="zh-TW" b="0" i="0" dirty="0">
-                <a:solidFill>
-                  <a:srgbClr val="292929"/>
-                </a:solidFill>
-                <a:effectLst/>
-                <a:latin typeface="source-code-pro"/>
-              </a:rPr>
-              <a:t>list.reverse()</a:t>
-            </a:r>
-          </a:p>
-          <a:p>
-            <a:r>
-              <a:rPr lang="de-DE" altLang="zh-TW" dirty="0">
-                <a:solidFill>
-                  <a:srgbClr val="292929"/>
-                </a:solidFill>
-                <a:latin typeface="source-code-pro"/>
-              </a:rPr>
-              <a:t>max()/min()</a:t>
-            </a:r>
-            <a:endParaRPr lang="de-DE" altLang="zh-TW" b="0" i="0" dirty="0">
-              <a:solidFill>
-                <a:srgbClr val="292929"/>
-              </a:solidFill>
-              <a:effectLst/>
-              <a:latin typeface="source-code-pro"/>
-            </a:endParaRPr>
-          </a:p>
-          <a:p>
-            <a:r>
-              <a:rPr lang="en-US" altLang="zh-TW" dirty="0"/>
-              <a:t>sum()</a:t>
-            </a:r>
-          </a:p>
-          <a:p>
-            <a:r>
-              <a:rPr lang="en-US" altLang="zh-TW" dirty="0"/>
-              <a:t>join()</a:t>
-            </a:r>
-          </a:p>
-          <a:p>
-            <a:endParaRPr lang="en-US" altLang="zh-TW" dirty="0"/>
+              <a:t>https://selflearningsuccess.com/pythonstring/</a:t>
+            </a:r>
           </a:p>
         </p:txBody>
       </p:sp>
     </p:spTree>
     <p:extLst>
       <p:ext uri="{BB962C8B-B14F-4D97-AF65-F5344CB8AC3E}">
-        <p14:creationId xmlns:p14="http://schemas.microsoft.com/office/powerpoint/2010/main" val="3674687679"/>
+        <p14:creationId xmlns:p14="http://schemas.microsoft.com/office/powerpoint/2010/main" val="3135465547"/>
       </p:ext>
     </p:extLst>
   </p:cSld>
@@ -5251,8 +5174,16 @@
           <a:p>
             <a:pPr algn="ctr"/>
             <a:r>
-              <a:rPr lang="de-DE" altLang="zh-TW" b="1" dirty="0"/>
-              <a:t>List Comprehension</a:t>
+              <a:rPr lang="en-US" altLang="zh-TW" b="1" dirty="0"/>
+              <a:t>List</a:t>
+            </a:r>
+            <a:r>
+              <a:rPr lang="zh-TW" altLang="en-US" b="1" dirty="0"/>
+              <a:t> </a:t>
+            </a:r>
+            <a:r>
+              <a:rPr lang="en-US" altLang="zh-TW" b="1" dirty="0"/>
+              <a:t>Operation</a:t>
             </a:r>
             <a:endParaRPr lang="zh-TW" altLang="en-US" b="1" dirty="0"/>
           </a:p>
@@ -5277,21 +5208,212 @@
         <p:spPr/>
         <p:txBody>
           <a:bodyPr>
-            <a:normAutofit/>
+            <a:normAutofit fontScale="77500" lnSpcReduction="20000"/>
           </a:bodyPr>
           <a:lstStyle/>
           <a:p>
             <a:r>
               <a:rPr lang="en-US" altLang="zh-TW" dirty="0"/>
-              <a:t>list = [x for x in range(0,10)] </a:t>
-            </a:r>
+              <a:t>index : []</a:t>
+            </a:r>
+          </a:p>
+          <a:p>
+            <a:r>
+              <a:rPr lang="en-US" altLang="zh-TW" dirty="0" err="1"/>
+              <a:t>list.append</a:t>
+            </a:r>
+            <a:r>
+              <a:rPr lang="en-US" altLang="zh-TW" dirty="0"/>
+              <a:t>(</a:t>
+            </a:r>
+            <a:r>
+              <a:rPr lang="en-US" altLang="zh-TW" b="0" i="0" dirty="0">
+                <a:solidFill>
+                  <a:srgbClr val="292929"/>
+                </a:solidFill>
+                <a:effectLst/>
+                <a:latin typeface="source-code-pro"/>
+              </a:rPr>
+              <a:t>object</a:t>
+            </a:r>
+            <a:r>
+              <a:rPr lang="en-US" altLang="zh-TW" dirty="0"/>
+              <a:t>)</a:t>
+            </a:r>
+          </a:p>
+          <a:p>
+            <a:r>
+              <a:rPr lang="en-US" altLang="zh-TW" b="0" i="0" dirty="0" err="1">
+                <a:solidFill>
+                  <a:srgbClr val="292929"/>
+                </a:solidFill>
+                <a:effectLst/>
+                <a:latin typeface="source-code-pro"/>
+              </a:rPr>
+              <a:t>list.insert</a:t>
+            </a:r>
+            <a:r>
+              <a:rPr lang="en-US" altLang="zh-TW" b="0" i="0" dirty="0">
+                <a:solidFill>
+                  <a:srgbClr val="292929"/>
+                </a:solidFill>
+                <a:effectLst/>
+                <a:latin typeface="source-code-pro"/>
+              </a:rPr>
+              <a:t>(position, object)</a:t>
+            </a:r>
+          </a:p>
+          <a:p>
+            <a:r>
+              <a:rPr lang="en-US" altLang="zh-TW" dirty="0" err="1"/>
+              <a:t>list.extend</a:t>
+            </a:r>
+            <a:r>
+              <a:rPr lang="en-US" altLang="zh-TW" dirty="0"/>
+              <a:t>()</a:t>
+            </a:r>
+          </a:p>
+          <a:p>
+            <a:r>
+              <a:rPr lang="de-DE" altLang="zh-TW" b="0" i="0" dirty="0">
+                <a:solidFill>
+                  <a:srgbClr val="292929"/>
+                </a:solidFill>
+                <a:effectLst/>
+                <a:latin typeface="source-code-pro"/>
+              </a:rPr>
+              <a:t>list.remove(object)</a:t>
+            </a:r>
+          </a:p>
+          <a:p>
+            <a:r>
+              <a:rPr lang="de-DE" altLang="zh-TW" b="0" i="0" dirty="0">
+                <a:solidFill>
+                  <a:srgbClr val="292929"/>
+                </a:solidFill>
+                <a:effectLst/>
+                <a:latin typeface="source-code-pro"/>
+              </a:rPr>
+              <a:t>list.pop()</a:t>
+            </a:r>
+            <a:endParaRPr lang="de-DE" altLang="zh-TW" dirty="0">
+              <a:solidFill>
+                <a:srgbClr val="292929"/>
+              </a:solidFill>
+              <a:latin typeface="source-code-pro"/>
+            </a:endParaRPr>
+          </a:p>
+          <a:p>
+            <a:r>
+              <a:rPr lang="de-DE" altLang="zh-TW" b="0" i="0" dirty="0">
+                <a:solidFill>
+                  <a:srgbClr val="292929"/>
+                </a:solidFill>
+                <a:effectLst/>
+                <a:latin typeface="source-code-pro"/>
+              </a:rPr>
+              <a:t>list.sort(reverse=True/False)</a:t>
+            </a:r>
+          </a:p>
+          <a:p>
+            <a:r>
+              <a:rPr lang="en-US" altLang="zh-TW" b="0" i="0" dirty="0" err="1">
+                <a:solidFill>
+                  <a:srgbClr val="292929"/>
+                </a:solidFill>
+                <a:effectLst/>
+                <a:latin typeface="source-code-pro"/>
+              </a:rPr>
+              <a:t>sorted_list</a:t>
+            </a:r>
+            <a:r>
+              <a:rPr lang="en-US" altLang="zh-TW" b="0" i="0" dirty="0">
+                <a:solidFill>
+                  <a:srgbClr val="292929"/>
+                </a:solidFill>
+                <a:effectLst/>
+                <a:latin typeface="source-code-pro"/>
+              </a:rPr>
+              <a:t> = sorted(</a:t>
+            </a:r>
+            <a:r>
+              <a:rPr lang="en-US" altLang="zh-TW" b="0" i="0" dirty="0" err="1">
+                <a:solidFill>
+                  <a:srgbClr val="292929"/>
+                </a:solidFill>
+                <a:effectLst/>
+                <a:latin typeface="source-code-pro"/>
+              </a:rPr>
+              <a:t>list_name</a:t>
+            </a:r>
+            <a:r>
+              <a:rPr lang="en-US" altLang="zh-TW" b="0" i="0" dirty="0">
+                <a:solidFill>
+                  <a:srgbClr val="292929"/>
+                </a:solidFill>
+                <a:effectLst/>
+                <a:latin typeface="source-code-pro"/>
+              </a:rPr>
+              <a:t>)</a:t>
+            </a:r>
+            <a:endParaRPr lang="de-DE" altLang="zh-TW" dirty="0">
+              <a:solidFill>
+                <a:srgbClr val="292929"/>
+              </a:solidFill>
+              <a:latin typeface="source-code-pro"/>
+            </a:endParaRPr>
+          </a:p>
+          <a:p>
+            <a:r>
+              <a:rPr lang="de-DE" altLang="zh-TW" b="0" i="0" dirty="0">
+                <a:solidFill>
+                  <a:srgbClr val="292929"/>
+                </a:solidFill>
+                <a:effectLst/>
+                <a:latin typeface="source-code-pro"/>
+              </a:rPr>
+              <a:t>list.reverse()</a:t>
+            </a:r>
+          </a:p>
+          <a:p>
+            <a:r>
+              <a:rPr lang="de-DE" altLang="zh-TW" dirty="0">
+                <a:solidFill>
+                  <a:srgbClr val="292929"/>
+                </a:solidFill>
+                <a:latin typeface="source-code-pro"/>
+              </a:rPr>
+              <a:t>max()/min()</a:t>
+            </a:r>
+            <a:endParaRPr lang="de-DE" altLang="zh-TW" b="0" i="0" dirty="0">
+              <a:solidFill>
+                <a:srgbClr val="292929"/>
+              </a:solidFill>
+              <a:effectLst/>
+              <a:latin typeface="source-code-pro"/>
+            </a:endParaRPr>
+          </a:p>
+          <a:p>
+            <a:r>
+              <a:rPr lang="en-US" altLang="zh-TW" dirty="0"/>
+              <a:t>sum()</a:t>
+            </a:r>
+          </a:p>
+          <a:p>
+            <a:r>
+              <a:rPr lang="en-US" altLang="zh-TW" dirty="0"/>
+              <a:t>join()</a:t>
+            </a:r>
+          </a:p>
+          <a:p>
+            <a:endParaRPr lang="en-US" altLang="zh-TW" dirty="0"/>
           </a:p>
         </p:txBody>
       </p:sp>
     </p:spTree>
     <p:extLst>
       <p:ext uri="{BB962C8B-B14F-4D97-AF65-F5344CB8AC3E}">
-        <p14:creationId xmlns:p14="http://schemas.microsoft.com/office/powerpoint/2010/main" val="2808680511"/>
+        <p14:creationId xmlns:p14="http://schemas.microsoft.com/office/powerpoint/2010/main" val="3674687679"/>
       </p:ext>
     </p:extLst>
   </p:cSld>

</xml_diff>